<commit_message>
added citations, email address for obi users couple of little text moves.
</commit_message>
<xml_diff>
--- a/docs/posters/general_ICBO 2009/Poster.pptx
+++ b/docs/posters/general_ICBO 2009/Poster.pptx
@@ -1,6 +1,6 @@
 
 <file path=ppt/presentation.xml><?xml version="1.0" encoding="utf-8"?>
-<p:presentation xmlns:a="http://schemas.openxmlformats.org/drawingml/2006/main" xmlns:r="http://schemas.openxmlformats.org/officeDocument/2006/relationships" xmlns:mc="http://schemas.openxmlformats.org/markup-compatibility/2006" xmlns:mv="urn:schemas-microsoft-com:mac:vml" xmlns:p="http://schemas.openxmlformats.org/presentationml/2006/main" mc:Ignorable="mv" mc:PreserveAttributes="mv:*" saveSubsetFonts="1">
+<p:presentation xmlns:a="http://schemas.openxmlformats.org/drawingml/2006/main" xmlns:r="http://schemas.openxmlformats.org/officeDocument/2006/relationships" xmlns:p="http://schemas.openxmlformats.org/presentationml/2006/main" saveSubsetFonts="1">
   <p:sldMasterIdLst>
     <p:sldMasterId id="2147483648" r:id="rId1"/>
   </p:sldMasterIdLst>
@@ -111,26 +111,13 @@
 </file>
 
 <file path=ppt/commentAuthors.xml><?xml version="1.0" encoding="utf-8"?>
-<p:cmAuthorLst xmlns:a="http://schemas.openxmlformats.org/drawingml/2006/main" xmlns:r="http://schemas.openxmlformats.org/officeDocument/2006/relationships" xmlns:mc="http://schemas.openxmlformats.org/markup-compatibility/2006" xmlns:mv="urn:schemas-microsoft-com:mac:vml" xmlns:p="http://schemas.openxmlformats.org/presentationml/2006/main" mc:Ignorable="mv" mc:PreserveAttributes="mv:*">
+<p:cmAuthorLst xmlns:a="http://schemas.openxmlformats.org/drawingml/2006/main" xmlns:r="http://schemas.openxmlformats.org/officeDocument/2006/relationships" xmlns:p="http://schemas.openxmlformats.org/presentationml/2006/main">
   <p:cmAuthor id="0" name="Melanie Courtot" initials="CS" lastIdx="2" clrIdx="0"/>
 </p:cmAuthorLst>
 </file>
 
-<file path=ppt/comments/comment1.xml><?xml version="1.0" encoding="utf-8"?>
-<p:cmLst xmlns:a="http://schemas.openxmlformats.org/drawingml/2006/main" xmlns:r="http://schemas.openxmlformats.org/officeDocument/2006/relationships" xmlns:mc="http://schemas.openxmlformats.org/markup-compatibility/2006" xmlns:mv="urn:schemas-microsoft-com:mac:vml" xmlns:p="http://schemas.openxmlformats.org/presentationml/2006/main" mc:Ignorable="mv" mc:PreserveAttributes="mv:*">
-  <p:cm authorId="0" dt="2009-07-23T14:55:33.673" idx="1">
-    <p:pos x="2376" y="984"/>
-    <p:text>expand and cite</p:text>
-  </p:cm>
-  <p:cm authorId="0" dt="2009-07-23T15:01:04.813" idx="2">
-    <p:pos x="1568" y="1832"/>
-    <p:text>cite</p:text>
-  </p:cm>
-</p:cmLst>
-</file>
-
 <file path=ppt/notesMasters/notesMaster1.xml><?xml version="1.0" encoding="utf-8"?>
-<p:notesMaster xmlns:a="http://schemas.openxmlformats.org/drawingml/2006/main" xmlns:r="http://schemas.openxmlformats.org/officeDocument/2006/relationships" xmlns:mc="http://schemas.openxmlformats.org/markup-compatibility/2006" xmlns:mv="urn:schemas-microsoft-com:mac:vml" xmlns:p="http://schemas.openxmlformats.org/presentationml/2006/main" mc:Ignorable="mv" mc:PreserveAttributes="mv:*">
+<p:notesMaster xmlns:a="http://schemas.openxmlformats.org/drawingml/2006/main" xmlns:r="http://schemas.openxmlformats.org/officeDocument/2006/relationships" xmlns:p="http://schemas.openxmlformats.org/presentationml/2006/main">
   <p:cSld>
     <p:bg>
       <p:bgRef idx="1001">
@@ -212,7 +199,7 @@
             <a:fld id="{C43C3973-7D2A-44FF-B793-9C9CC3912CA6}" type="datetimeFigureOut">
               <a:rPr lang="en-US" smtClean="0"/>
               <a:pPr/>
-              <a:t>7/23/09</a:t>
+              <a:t>7/24/2009</a:t>
             </a:fld>
             <a:endParaRPr lang="en-US"/>
           </a:p>
@@ -479,7 +466,7 @@
 </file>
 
 <file path=ppt/notesSlides/notesSlide1.xml><?xml version="1.0" encoding="utf-8"?>
-<p:notes xmlns:a="http://schemas.openxmlformats.org/drawingml/2006/main" xmlns:r="http://schemas.openxmlformats.org/officeDocument/2006/relationships" xmlns:mc="http://schemas.openxmlformats.org/markup-compatibility/2006" xmlns:mv="urn:schemas-microsoft-com:mac:vml" xmlns:p="http://schemas.openxmlformats.org/presentationml/2006/main" mc:Ignorable="mv" mc:PreserveAttributes="mv:*">
+<p:notes xmlns:a="http://schemas.openxmlformats.org/drawingml/2006/main" xmlns:r="http://schemas.openxmlformats.org/officeDocument/2006/relationships" xmlns:p="http://schemas.openxmlformats.org/presentationml/2006/main">
   <p:cSld>
     <p:spTree>
       <p:nvGrpSpPr>
@@ -566,7 +553,7 @@
 </file>
 
 <file path=ppt/slideLayouts/slideLayout1.xml><?xml version="1.0" encoding="utf-8"?>
-<p:sldLayout xmlns:a="http://schemas.openxmlformats.org/drawingml/2006/main" xmlns:r="http://schemas.openxmlformats.org/officeDocument/2006/relationships" xmlns:mc="http://schemas.openxmlformats.org/markup-compatibility/2006" xmlns:mv="urn:schemas-microsoft-com:mac:vml" xmlns:p="http://schemas.openxmlformats.org/presentationml/2006/main" mc:Ignorable="mv" mc:PreserveAttributes="mv:*" type="title" preserve="1">
+<p:sldLayout xmlns:a="http://schemas.openxmlformats.org/drawingml/2006/main" xmlns:r="http://schemas.openxmlformats.org/officeDocument/2006/relationships" xmlns:p="http://schemas.openxmlformats.org/presentationml/2006/main" type="title" preserve="1">
   <p:cSld name="Title Slide">
     <p:spTree>
       <p:nvGrpSpPr>
@@ -747,7 +734,7 @@
             <a:fld id="{5857B85E-793F-44C6-87E5-E4AB0831A5C0}" type="datetimeFigureOut">
               <a:rPr lang="en-US" smtClean="0"/>
               <a:pPr/>
-              <a:t>7/23/09</a:t>
+              <a:t>7/24/2009</a:t>
             </a:fld>
             <a:endParaRPr lang="en-US"/>
           </a:p>
@@ -805,7 +792,7 @@
 </file>
 
 <file path=ppt/slideLayouts/slideLayout10.xml><?xml version="1.0" encoding="utf-8"?>
-<p:sldLayout xmlns:a="http://schemas.openxmlformats.org/drawingml/2006/main" xmlns:r="http://schemas.openxmlformats.org/officeDocument/2006/relationships" xmlns:mc="http://schemas.openxmlformats.org/markup-compatibility/2006" xmlns:mv="urn:schemas-microsoft-com:mac:vml" xmlns:p="http://schemas.openxmlformats.org/presentationml/2006/main" mc:Ignorable="mv" mc:PreserveAttributes="mv:*" type="vertTx" preserve="1">
+<p:sldLayout xmlns:a="http://schemas.openxmlformats.org/drawingml/2006/main" xmlns:r="http://schemas.openxmlformats.org/officeDocument/2006/relationships" xmlns:p="http://schemas.openxmlformats.org/presentationml/2006/main" type="vertTx" preserve="1">
   <p:cSld name="Title and Vertical Text">
     <p:spTree>
       <p:nvGrpSpPr>
@@ -914,7 +901,7 @@
             <a:fld id="{5857B85E-793F-44C6-87E5-E4AB0831A5C0}" type="datetimeFigureOut">
               <a:rPr lang="en-US" smtClean="0"/>
               <a:pPr/>
-              <a:t>7/23/09</a:t>
+              <a:t>7/24/2009</a:t>
             </a:fld>
             <a:endParaRPr lang="en-US"/>
           </a:p>
@@ -972,7 +959,7 @@
 </file>
 
 <file path=ppt/slideLayouts/slideLayout11.xml><?xml version="1.0" encoding="utf-8"?>
-<p:sldLayout xmlns:a="http://schemas.openxmlformats.org/drawingml/2006/main" xmlns:r="http://schemas.openxmlformats.org/officeDocument/2006/relationships" xmlns:mc="http://schemas.openxmlformats.org/markup-compatibility/2006" xmlns:mv="urn:schemas-microsoft-com:mac:vml" xmlns:p="http://schemas.openxmlformats.org/presentationml/2006/main" mc:Ignorable="mv" mc:PreserveAttributes="mv:*" type="vertTitleAndTx" preserve="1">
+<p:sldLayout xmlns:a="http://schemas.openxmlformats.org/drawingml/2006/main" xmlns:r="http://schemas.openxmlformats.org/officeDocument/2006/relationships" xmlns:p="http://schemas.openxmlformats.org/presentationml/2006/main" type="vertTitleAndTx" preserve="1">
   <p:cSld name="Vertical Title and Text">
     <p:spTree>
       <p:nvGrpSpPr>
@@ -1091,7 +1078,7 @@
             <a:fld id="{5857B85E-793F-44C6-87E5-E4AB0831A5C0}" type="datetimeFigureOut">
               <a:rPr lang="en-US" smtClean="0"/>
               <a:pPr/>
-              <a:t>7/23/09</a:t>
+              <a:t>7/24/2009</a:t>
             </a:fld>
             <a:endParaRPr lang="en-US"/>
           </a:p>
@@ -1149,7 +1136,7 @@
 </file>
 
 <file path=ppt/slideLayouts/slideLayout2.xml><?xml version="1.0" encoding="utf-8"?>
-<p:sldLayout xmlns:a="http://schemas.openxmlformats.org/drawingml/2006/main" xmlns:r="http://schemas.openxmlformats.org/officeDocument/2006/relationships" xmlns:mc="http://schemas.openxmlformats.org/markup-compatibility/2006" xmlns:mv="urn:schemas-microsoft-com:mac:vml" xmlns:p="http://schemas.openxmlformats.org/presentationml/2006/main" mc:Ignorable="mv" mc:PreserveAttributes="mv:*" type="obj" preserve="1">
+<p:sldLayout xmlns:a="http://schemas.openxmlformats.org/drawingml/2006/main" xmlns:r="http://schemas.openxmlformats.org/officeDocument/2006/relationships" xmlns:p="http://schemas.openxmlformats.org/presentationml/2006/main" type="obj" preserve="1">
   <p:cSld name="Title and Content">
     <p:spTree>
       <p:nvGrpSpPr>
@@ -1258,7 +1245,7 @@
             <a:fld id="{5857B85E-793F-44C6-87E5-E4AB0831A5C0}" type="datetimeFigureOut">
               <a:rPr lang="en-US" smtClean="0"/>
               <a:pPr/>
-              <a:t>7/23/09</a:t>
+              <a:t>7/24/2009</a:t>
             </a:fld>
             <a:endParaRPr lang="en-US"/>
           </a:p>
@@ -1316,7 +1303,7 @@
 </file>
 
 <file path=ppt/slideLayouts/slideLayout3.xml><?xml version="1.0" encoding="utf-8"?>
-<p:sldLayout xmlns:a="http://schemas.openxmlformats.org/drawingml/2006/main" xmlns:r="http://schemas.openxmlformats.org/officeDocument/2006/relationships" xmlns:mc="http://schemas.openxmlformats.org/markup-compatibility/2006" xmlns:mv="urn:schemas-microsoft-com:mac:vml" xmlns:p="http://schemas.openxmlformats.org/presentationml/2006/main" mc:Ignorable="mv" mc:PreserveAttributes="mv:*" type="secHead" preserve="1">
+<p:sldLayout xmlns:a="http://schemas.openxmlformats.org/drawingml/2006/main" xmlns:r="http://schemas.openxmlformats.org/officeDocument/2006/relationships" xmlns:p="http://schemas.openxmlformats.org/presentationml/2006/main" type="secHead" preserve="1">
   <p:cSld name="Section Header">
     <p:spTree>
       <p:nvGrpSpPr>
@@ -1501,7 +1488,7 @@
             <a:fld id="{5857B85E-793F-44C6-87E5-E4AB0831A5C0}" type="datetimeFigureOut">
               <a:rPr lang="en-US" smtClean="0"/>
               <a:pPr/>
-              <a:t>7/23/09</a:t>
+              <a:t>7/24/2009</a:t>
             </a:fld>
             <a:endParaRPr lang="en-US"/>
           </a:p>
@@ -1559,7 +1546,7 @@
 </file>
 
 <file path=ppt/slideLayouts/slideLayout4.xml><?xml version="1.0" encoding="utf-8"?>
-<p:sldLayout xmlns:a="http://schemas.openxmlformats.org/drawingml/2006/main" xmlns:r="http://schemas.openxmlformats.org/officeDocument/2006/relationships" xmlns:mc="http://schemas.openxmlformats.org/markup-compatibility/2006" xmlns:mv="urn:schemas-microsoft-com:mac:vml" xmlns:p="http://schemas.openxmlformats.org/presentationml/2006/main" mc:Ignorable="mv" mc:PreserveAttributes="mv:*" type="twoObj" preserve="1">
+<p:sldLayout xmlns:a="http://schemas.openxmlformats.org/drawingml/2006/main" xmlns:r="http://schemas.openxmlformats.org/officeDocument/2006/relationships" xmlns:p="http://schemas.openxmlformats.org/presentationml/2006/main" type="twoObj" preserve="1">
   <p:cSld name="Two Content">
     <p:spTree>
       <p:nvGrpSpPr>
@@ -1786,7 +1773,7 @@
             <a:fld id="{5857B85E-793F-44C6-87E5-E4AB0831A5C0}" type="datetimeFigureOut">
               <a:rPr lang="en-US" smtClean="0"/>
               <a:pPr/>
-              <a:t>7/23/09</a:t>
+              <a:t>7/24/2009</a:t>
             </a:fld>
             <a:endParaRPr lang="en-US"/>
           </a:p>
@@ -1844,7 +1831,7 @@
 </file>
 
 <file path=ppt/slideLayouts/slideLayout5.xml><?xml version="1.0" encoding="utf-8"?>
-<p:sldLayout xmlns:a="http://schemas.openxmlformats.org/drawingml/2006/main" xmlns:r="http://schemas.openxmlformats.org/officeDocument/2006/relationships" xmlns:mc="http://schemas.openxmlformats.org/markup-compatibility/2006" xmlns:mv="urn:schemas-microsoft-com:mac:vml" xmlns:p="http://schemas.openxmlformats.org/presentationml/2006/main" mc:Ignorable="mv" mc:PreserveAttributes="mv:*" type="twoTxTwoObj" preserve="1">
+<p:sldLayout xmlns:a="http://schemas.openxmlformats.org/drawingml/2006/main" xmlns:r="http://schemas.openxmlformats.org/officeDocument/2006/relationships" xmlns:p="http://schemas.openxmlformats.org/presentationml/2006/main" type="twoTxTwoObj" preserve="1">
   <p:cSld name="Comparison">
     <p:spTree>
       <p:nvGrpSpPr>
@@ -2205,7 +2192,7 @@
             <a:fld id="{5857B85E-793F-44C6-87E5-E4AB0831A5C0}" type="datetimeFigureOut">
               <a:rPr lang="en-US" smtClean="0"/>
               <a:pPr/>
-              <a:t>7/23/09</a:t>
+              <a:t>7/24/2009</a:t>
             </a:fld>
             <a:endParaRPr lang="en-US"/>
           </a:p>
@@ -2263,7 +2250,7 @@
 </file>
 
 <file path=ppt/slideLayouts/slideLayout6.xml><?xml version="1.0" encoding="utf-8"?>
-<p:sldLayout xmlns:a="http://schemas.openxmlformats.org/drawingml/2006/main" xmlns:r="http://schemas.openxmlformats.org/officeDocument/2006/relationships" xmlns:mc="http://schemas.openxmlformats.org/markup-compatibility/2006" xmlns:mv="urn:schemas-microsoft-com:mac:vml" xmlns:p="http://schemas.openxmlformats.org/presentationml/2006/main" mc:Ignorable="mv" mc:PreserveAttributes="mv:*" type="titleOnly" preserve="1">
+<p:sldLayout xmlns:a="http://schemas.openxmlformats.org/drawingml/2006/main" xmlns:r="http://schemas.openxmlformats.org/officeDocument/2006/relationships" xmlns:p="http://schemas.openxmlformats.org/presentationml/2006/main" type="titleOnly" preserve="1">
   <p:cSld name="Title Only">
     <p:spTree>
       <p:nvGrpSpPr>
@@ -2320,7 +2307,7 @@
             <a:fld id="{5857B85E-793F-44C6-87E5-E4AB0831A5C0}" type="datetimeFigureOut">
               <a:rPr lang="en-US" smtClean="0"/>
               <a:pPr/>
-              <a:t>7/23/09</a:t>
+              <a:t>7/24/2009</a:t>
             </a:fld>
             <a:endParaRPr lang="en-US"/>
           </a:p>
@@ -2378,7 +2365,7 @@
 </file>
 
 <file path=ppt/slideLayouts/slideLayout7.xml><?xml version="1.0" encoding="utf-8"?>
-<p:sldLayout xmlns:a="http://schemas.openxmlformats.org/drawingml/2006/main" xmlns:r="http://schemas.openxmlformats.org/officeDocument/2006/relationships" xmlns:mc="http://schemas.openxmlformats.org/markup-compatibility/2006" xmlns:mv="urn:schemas-microsoft-com:mac:vml" xmlns:p="http://schemas.openxmlformats.org/presentationml/2006/main" mc:Ignorable="mv" mc:PreserveAttributes="mv:*" type="blank" preserve="1">
+<p:sldLayout xmlns:a="http://schemas.openxmlformats.org/drawingml/2006/main" xmlns:r="http://schemas.openxmlformats.org/officeDocument/2006/relationships" xmlns:p="http://schemas.openxmlformats.org/presentationml/2006/main" type="blank" preserve="1">
   <p:cSld name="Blank">
     <p:spTree>
       <p:nvGrpSpPr>
@@ -2412,7 +2399,7 @@
             <a:fld id="{5857B85E-793F-44C6-87E5-E4AB0831A5C0}" type="datetimeFigureOut">
               <a:rPr lang="en-US" smtClean="0"/>
               <a:pPr/>
-              <a:t>7/23/09</a:t>
+              <a:t>7/24/2009</a:t>
             </a:fld>
             <a:endParaRPr lang="en-US"/>
           </a:p>
@@ -2470,7 +2457,7 @@
 </file>
 
 <file path=ppt/slideLayouts/slideLayout8.xml><?xml version="1.0" encoding="utf-8"?>
-<p:sldLayout xmlns:a="http://schemas.openxmlformats.org/drawingml/2006/main" xmlns:r="http://schemas.openxmlformats.org/officeDocument/2006/relationships" xmlns:mc="http://schemas.openxmlformats.org/markup-compatibility/2006" xmlns:mv="urn:schemas-microsoft-com:mac:vml" xmlns:p="http://schemas.openxmlformats.org/presentationml/2006/main" mc:Ignorable="mv" mc:PreserveAttributes="mv:*" type="objTx" preserve="1">
+<p:sldLayout xmlns:a="http://schemas.openxmlformats.org/drawingml/2006/main" xmlns:r="http://schemas.openxmlformats.org/officeDocument/2006/relationships" xmlns:p="http://schemas.openxmlformats.org/presentationml/2006/main" type="objTx" preserve="1">
   <p:cSld name="Content with Caption">
     <p:spTree>
       <p:nvGrpSpPr>
@@ -2686,7 +2673,7 @@
             <a:fld id="{5857B85E-793F-44C6-87E5-E4AB0831A5C0}" type="datetimeFigureOut">
               <a:rPr lang="en-US" smtClean="0"/>
               <a:pPr/>
-              <a:t>7/23/09</a:t>
+              <a:t>7/24/2009</a:t>
             </a:fld>
             <a:endParaRPr lang="en-US"/>
           </a:p>
@@ -2744,7 +2731,7 @@
 </file>
 
 <file path=ppt/slideLayouts/slideLayout9.xml><?xml version="1.0" encoding="utf-8"?>
-<p:sldLayout xmlns:a="http://schemas.openxmlformats.org/drawingml/2006/main" xmlns:r="http://schemas.openxmlformats.org/officeDocument/2006/relationships" xmlns:mc="http://schemas.openxmlformats.org/markup-compatibility/2006" xmlns:mv="urn:schemas-microsoft-com:mac:vml" xmlns:p="http://schemas.openxmlformats.org/presentationml/2006/main" mc:Ignorable="mv" mc:PreserveAttributes="mv:*" type="picTx" preserve="1">
+<p:sldLayout xmlns:a="http://schemas.openxmlformats.org/drawingml/2006/main" xmlns:r="http://schemas.openxmlformats.org/officeDocument/2006/relationships" xmlns:p="http://schemas.openxmlformats.org/presentationml/2006/main" type="picTx" preserve="1">
   <p:cSld name="Picture with Caption">
     <p:spTree>
       <p:nvGrpSpPr>
@@ -2936,7 +2923,7 @@
             <a:fld id="{5857B85E-793F-44C6-87E5-E4AB0831A5C0}" type="datetimeFigureOut">
               <a:rPr lang="en-US" smtClean="0"/>
               <a:pPr/>
-              <a:t>7/23/09</a:t>
+              <a:t>7/24/2009</a:t>
             </a:fld>
             <a:endParaRPr lang="en-US"/>
           </a:p>
@@ -2994,7 +2981,7 @@
 </file>
 
 <file path=ppt/slideMasters/slideMaster1.xml><?xml version="1.0" encoding="utf-8"?>
-<p:sldMaster xmlns:a="http://schemas.openxmlformats.org/drawingml/2006/main" xmlns:r="http://schemas.openxmlformats.org/officeDocument/2006/relationships" xmlns:mc="http://schemas.openxmlformats.org/markup-compatibility/2006" xmlns:mv="urn:schemas-microsoft-com:mac:vml" xmlns:p="http://schemas.openxmlformats.org/presentationml/2006/main" mc:Ignorable="mv" mc:PreserveAttributes="mv:*">
+<p:sldMaster xmlns:a="http://schemas.openxmlformats.org/drawingml/2006/main" xmlns:r="http://schemas.openxmlformats.org/officeDocument/2006/relationships" xmlns:p="http://schemas.openxmlformats.org/presentationml/2006/main">
   <p:cSld>
     <p:bg>
       <p:bgRef idx="1001">
@@ -3146,7 +3133,7 @@
             <a:fld id="{5857B85E-793F-44C6-87E5-E4AB0831A5C0}" type="datetimeFigureOut">
               <a:rPr lang="en-US" smtClean="0"/>
               <a:pPr/>
-              <a:t>7/23/09</a:t>
+              <a:t>7/24/2009</a:t>
             </a:fld>
             <a:endParaRPr lang="en-US"/>
           </a:p>
@@ -3501,7 +3488,7 @@
 </file>
 
 <file path=ppt/slides/slide1.xml><?xml version="1.0" encoding="utf-8"?>
-<p:sld xmlns:a="http://schemas.openxmlformats.org/drawingml/2006/main" xmlns:r="http://schemas.openxmlformats.org/officeDocument/2006/relationships" xmlns:mc="http://schemas.openxmlformats.org/markup-compatibility/2006" xmlns:mv="urn:schemas-microsoft-com:mac:vml" xmlns:p="http://schemas.openxmlformats.org/presentationml/2006/main" mc:Ignorable="mv" mc:PreserveAttributes="mv:*">
+<p:sld xmlns:a="http://schemas.openxmlformats.org/drawingml/2006/main" xmlns:r="http://schemas.openxmlformats.org/officeDocument/2006/relationships" xmlns:p="http://schemas.openxmlformats.org/presentationml/2006/main">
   <p:cSld>
     <p:bg>
       <p:bgPr>
@@ -4241,7 +4228,7 @@
         <p:spPr>
           <a:xfrm>
             <a:off x="1066800" y="114300"/>
-            <a:ext cx="5638800" cy="677108"/>
+            <a:ext cx="5638800" cy="892552"/>
           </a:xfrm>
           <a:prstGeom prst="rect">
             <a:avLst/>
@@ -4277,8 +4264,31 @@
               <a:t>The OBI Consortium*, </a:t>
             </a:r>
             <a:r>
+              <a:rPr lang="en-US" sz="1400" b="1" u="sng" dirty="0" smtClean="0">
+                <a:hlinkClick r:id="rId3"/>
+              </a:rPr>
+              <a:t>http://</a:t>
+            </a:r>
+            <a:r>
+              <a:rPr lang="en-US" sz="1400" b="1" u="sng" dirty="0" smtClean="0">
+                <a:hlinkClick r:id="rId3"/>
+              </a:rPr>
+              <a:t>obi-ontology.org</a:t>
+            </a:r>
+            <a:r>
               <a:rPr lang="en-US" sz="1400" b="1" u="sng" dirty="0" smtClean="0"/>
-              <a:t>http://obi-ontology.org</a:t>
+              <a:t/>
+            </a:r>
+            <a:br>
+              <a:rPr lang="en-US" sz="1400" b="1" u="sng" dirty="0" smtClean="0"/>
+            </a:br>
+            <a:r>
+              <a:rPr lang="en-US" sz="1400" b="1" dirty="0" smtClean="0"/>
+              <a:t>email</a:t>
+            </a:r>
+            <a:r>
+              <a:rPr lang="en-US" sz="1400" b="1" dirty="0" smtClean="0"/>
+              <a:t>: obi-users@googlegroups.com</a:t>
             </a:r>
             <a:endParaRPr lang="en-US" sz="1400" b="1" dirty="0"/>
           </a:p>
@@ -4293,7 +4303,7 @@
           <p:nvPr/>
         </p:nvPicPr>
         <p:blipFill>
-          <a:blip r:embed="rId3" cstate="print"/>
+          <a:blip r:embed="rId4" cstate="print"/>
           <a:srcRect l="4799" t="10324" r="7047" b="30769"/>
           <a:stretch>
             <a:fillRect/>
@@ -4331,8 +4341,8 @@
         </p:nvSpPr>
         <p:spPr>
           <a:xfrm>
-            <a:off x="152400" y="792540"/>
-            <a:ext cx="6553200" cy="1754327"/>
+            <a:off x="152400" y="915650"/>
+            <a:ext cx="6553200" cy="1446550"/>
           </a:xfrm>
           <a:prstGeom prst="rect">
             <a:avLst/>
@@ -4347,30 +4357,46 @@
           <a:p>
             <a:pPr algn="just"/>
             <a:r>
-              <a:rPr lang="en-US" sz="1200" i="1" dirty="0" smtClean="0"/>
-              <a:t>The goal of OBI is to enable a formal representation of biomedical investigations that captures the experimental evidence on which their findings are based. OBI allows for the comparison of experimental data from the wide array of scientific disciplines represented by domain experts in the OBI consortium. OBI follows the principles laid out by the OBO foundry, and integrates tightly with other foundry candidate ontologies, such as GO and </a:t>
-            </a:r>
-            <a:r>
-              <a:rPr lang="en-US" sz="1200" i="1" dirty="0" err="1" smtClean="0"/>
+              <a:rPr lang="en-US" sz="1100" i="1" dirty="0" smtClean="0"/>
+              <a:t>The goal of OBI is to enable a formal representation of biomedical investigations that captures the experimental evidence on which their findings are based. OBI allows for the comparison of experimental data from the wide array of scientific disciplines represented by domain experts in the OBI consortium. OBI follows the principles laid out by the OBO foundry, and integrates tightly with other foundry candidate ontologies, such as GO </a:t>
+            </a:r>
+            <a:r>
+              <a:rPr lang="en-US" sz="1100" i="1" dirty="0" smtClean="0"/>
+              <a:t>(</a:t>
+            </a:r>
+            <a:r>
+              <a:rPr lang="en-GB" sz="1100" i="1" dirty="0" smtClean="0"/>
+              <a:t>www.geneontology.org</a:t>
+            </a:r>
+            <a:r>
+              <a:rPr lang="en-US" sz="1100" i="1" dirty="0" smtClean="0"/>
+              <a:t>) and </a:t>
+            </a:r>
+            <a:r>
+              <a:rPr lang="en-US" sz="1100" i="1" dirty="0" err="1" smtClean="0"/>
               <a:t>ChEBI</a:t>
             </a:r>
             <a:r>
-              <a:rPr lang="en-US" sz="1200" i="1" dirty="0"/>
+              <a:rPr lang="en-US" sz="1100" i="1" dirty="0"/>
               <a:t> </a:t>
             </a:r>
             <a:r>
-              <a:rPr lang="en-US" sz="1200" i="1" dirty="0" smtClean="0"/>
-              <a:t>whose terms are used to describe biological reality. The use of OBI by the scientific community to represent or annotate their investigations within electronic data resources will </a:t>
-            </a:r>
-            <a:r>
-              <a:rPr lang="en-US" sz="1200" i="1" dirty="0" smtClean="0"/>
-              <a:t>alleviate the </a:t>
-            </a:r>
-            <a:r>
-              <a:rPr lang="en-US" sz="1200" i="1" dirty="0" smtClean="0"/>
-              <a:t>need for lower accuracy text mining and enable semantic web searches and third-party understanding of information related to life-science and clinical investigations.</a:t>
-            </a:r>
-            <a:endParaRPr lang="en-US" sz="1200" dirty="0"/>
+              <a:rPr lang="en-US" sz="1100" i="1" dirty="0" smtClean="0"/>
+              <a:t>(</a:t>
+            </a:r>
+            <a:r>
+              <a:rPr lang="en-GB" sz="1100" i="1" dirty="0" smtClean="0"/>
+              <a:t>www.ebi.ac.uk/chebi/</a:t>
+            </a:r>
+            <a:r>
+              <a:rPr lang="en-US" sz="1100" i="1" dirty="0" smtClean="0"/>
+              <a:t>) whose </a:t>
+            </a:r>
+            <a:r>
+              <a:rPr lang="en-US" sz="1100" i="1" dirty="0" smtClean="0"/>
+              <a:t>terms are used to describe biological reality. The use of OBI by the scientific community to represent or annotate their investigations within electronic data resources will alleviate the need for lower accuracy text mining and enable semantic web searches and third-party understanding of information related to life-science and clinical investigations.</a:t>
+            </a:r>
+            <a:endParaRPr lang="en-US" sz="1100" dirty="0"/>
           </a:p>
         </p:txBody>
       </p:sp>
@@ -4440,7 +4466,7 @@
             <p:nvPr/>
           </p:nvPicPr>
           <p:blipFill>
-            <a:blip r:embed="rId4" cstate="print"/>
+            <a:blip r:embed="rId5" cstate="print"/>
             <a:srcRect l="1601" t="2000" r="5559"/>
             <a:stretch>
               <a:fillRect/>
@@ -4471,8 +4497,8 @@
           </p:nvSpPr>
           <p:spPr>
             <a:xfrm>
-              <a:off x="4457700" y="5105400"/>
-              <a:ext cx="2286000" cy="3785652"/>
+              <a:off x="4495800" y="5105400"/>
+              <a:ext cx="2247900" cy="3785652"/>
             </a:xfrm>
             <a:prstGeom prst="rect">
               <a:avLst/>
@@ -4547,15 +4573,15 @@
               </a:r>
               <a:r>
                 <a:rPr lang="en-US" sz="1000" dirty="0" smtClean="0"/>
-                <a:t> (glucose) concentration. This modeling of a specific use case is used as the basis for generation of pattern templates [ref </a:t>
-              </a:r>
-              <a:r>
-                <a:rPr lang="en-US" sz="1000" dirty="0" err="1" smtClean="0"/>
-                <a:t>QuickTerms</a:t>
+                <a:t> (glucose) concentration. This modeling of a specific use case is used as the basis for generation of pattern templates </a:t>
               </a:r>
               <a:r>
                 <a:rPr lang="en-US" sz="1000" dirty="0" smtClean="0"/>
-                <a:t>] allowing us to automate following additions of similar processes</a:t>
+                <a:t>allowing </a:t>
+              </a:r>
+              <a:r>
+                <a:rPr lang="en-US" sz="1000" dirty="0" smtClean="0"/>
+                <a:t>us to automate following additions of similar processes</a:t>
               </a:r>
               <a:endParaRPr lang="en-US" sz="1000" dirty="0"/>
             </a:p>
@@ -4602,7 +4628,7 @@
           <p:nvPr/>
         </p:nvPicPr>
         <p:blipFill>
-          <a:blip r:embed="rId5" cstate="print"/>
+          <a:blip r:embed="rId6" cstate="print"/>
           <a:srcRect/>
           <a:stretch>
             <a:fillRect/>
@@ -4635,7 +4661,7 @@
         <p:spPr>
           <a:xfrm>
             <a:off x="152400" y="2438400"/>
-            <a:ext cx="2743200" cy="2215991"/>
+            <a:ext cx="2743200" cy="2369880"/>
           </a:xfrm>
           <a:prstGeom prst="rect">
             <a:avLst/>
@@ -4653,7 +4679,6 @@
               <a:rPr lang="en-US" sz="1400" b="1" dirty="0" smtClean="0"/>
               <a:t>Partial high-level is-a hierarchy of OBI classes. </a:t>
             </a:r>
-            <a:endParaRPr lang="en-US" sz="1400" b="1" dirty="0" smtClean="0"/>
           </a:p>
           <a:p>
             <a:pPr algn="just"/>
@@ -4662,16 +4687,28 @@
               <a:t>Under the Basic Formal Ontology (BFO) </a:t>
             </a:r>
             <a:r>
+              <a:rPr lang="en-US" sz="1000" dirty="0" smtClean="0"/>
+              <a:t>(</a:t>
+            </a:r>
+            <a:r>
+              <a:rPr lang="en-GB" sz="1000" i="1" dirty="0" smtClean="0"/>
+              <a:t>www.ifomis.org/bfo</a:t>
+            </a:r>
+            <a:r>
+              <a:rPr lang="en-US" sz="1000" dirty="0" smtClean="0"/>
+              <a:t>) </a:t>
+            </a:r>
+            <a:r>
               <a:rPr lang="en-US" sz="1000" i="1" dirty="0" smtClean="0"/>
-              <a:t>material entity, </a:t>
+              <a:t>material </a:t>
+            </a:r>
+            <a:r>
+              <a:rPr lang="en-US" sz="1000" i="1" dirty="0" smtClean="0"/>
+              <a:t>entity, </a:t>
             </a:r>
             <a:r>
               <a:rPr lang="en-US" sz="1000" dirty="0" smtClean="0"/>
-              <a:t>several </a:t>
-            </a:r>
-            <a:r>
-              <a:rPr lang="en-US" sz="1000" dirty="0" smtClean="0"/>
-              <a:t>classes are imported from outside ontologies (indicated in red). The </a:t>
+              <a:t>several classes are imported from outside ontologies (indicated in red). The </a:t>
             </a:r>
             <a:r>
               <a:rPr lang="en-US" sz="1000" i="1" dirty="0" smtClean="0"/>
@@ -4679,23 +4716,7 @@
             </a:r>
             <a:r>
               <a:rPr lang="en-US" sz="1000" dirty="0" smtClean="0"/>
-              <a:t> class</a:t>
-            </a:r>
-            <a:r>
-              <a:rPr lang="en-US" sz="1000" dirty="0" smtClean="0"/>
-              <a:t> represents entities </a:t>
-            </a:r>
-            <a:r>
-              <a:rPr lang="en-US" sz="1000" dirty="0" smtClean="0"/>
-              <a:t>that were generated in a planned </a:t>
-            </a:r>
-            <a:r>
-              <a:rPr lang="en-US" sz="1000" dirty="0" smtClean="0"/>
-              <a:t>process</a:t>
-            </a:r>
-            <a:r>
-              <a:rPr lang="en-US" sz="1000" dirty="0" smtClean="0"/>
-              <a:t>, meaning that they were intentionally created. </a:t>
+              <a:t> class represents entities that were generated in a planned process, meaning that they were intentionally created. </a:t>
             </a:r>
           </a:p>
           <a:p>

</xml_diff>

<commit_message>
merged changes to Chris version which was subsequent to my edits
</commit_message>
<xml_diff>
--- a/docs/posters/general_ICBO 2009/Poster.pptx
+++ b/docs/posters/general_ICBO 2009/Poster.pptx
@@ -4227,7 +4227,7 @@
         </p:nvSpPr>
         <p:spPr>
           <a:xfrm>
-            <a:off x="5120640" y="506437"/>
+            <a:off x="5120640" y="381000"/>
             <a:ext cx="27066240" cy="4085593"/>
           </a:xfrm>
           <a:prstGeom prst="rect">
@@ -4261,13 +4261,18 @@
             <a:pPr algn="ctr"/>
             <a:r>
               <a:rPr lang="en-US" sz="6400" b="1" dirty="0" smtClean="0"/>
-              <a:t>The OBI Consortium*, </a:t>
-            </a:r>
-            <a:r>
-              <a:rPr lang="en-US" sz="6400" b="1" u="sng" dirty="0" smtClean="0">
+              <a:t>The OBI Consortium*,</a:t>
+            </a:r>
+            <a:r>
+              <a:rPr lang="en-US" sz="6400" b="1" dirty="0" smtClean="0"/>
+              <a:t> </a:t>
+            </a:r>
+            <a:r>
+              <a:rPr lang="en-US" sz="6600" b="1" u="sng" dirty="0" smtClean="0">
+                <a:latin typeface="Calibri" pitchFamily="-65" charset="0"/>
                 <a:hlinkClick r:id="rId3"/>
               </a:rPr>
-              <a:t>http://obi-ontology.org</a:t>
+              <a:t>http://purl.obolibrary.org/obo/obi</a:t>
             </a:r>
             <a:r>
               <a:rPr lang="en-US" sz="6400" b="1" u="sng" dirty="0" smtClean="0"/>
@@ -4331,8 +4336,8 @@
         </p:nvSpPr>
         <p:spPr>
           <a:xfrm>
-            <a:off x="731520" y="4057034"/>
-            <a:ext cx="31455360" cy="6578583"/>
+            <a:off x="731520" y="3886200"/>
+            <a:ext cx="31455360" cy="6932525"/>
           </a:xfrm>
           <a:prstGeom prst="rect">
             <a:avLst/>
@@ -4347,38 +4352,56 @@
           <a:p>
             <a:pPr algn="just"/>
             <a:r>
-              <a:rPr lang="en-US" sz="5000" i="1" dirty="0" smtClean="0"/>
-              <a:t>The goal of OBI is to enable a formal representation of biomedical investigations that captures the experimental evidence on which their findings are based. OBI allows for the comparison of experimental data from the wide array of scientific disciplines represented by domain experts in the OBI consortium. OBI follows the principles laid out by the OBO foundry, and integrates tightly with other foundry candidate ontologies, such as GO (</a:t>
-            </a:r>
-            <a:r>
-              <a:rPr lang="en-GB" sz="5000" i="1" dirty="0" smtClean="0"/>
+              <a:rPr lang="en-US" sz="4600" i="1" dirty="0" smtClean="0">
+                <a:latin typeface="Calibri" pitchFamily="-65" charset="0"/>
+              </a:rPr>
+              <a:t>The goal of OBI is to enable a formal representation of biomedical investigations that captures the experimental evidence on which their findings are based. The scope of OBI includes: materials made in and produced for investigations, research objectives, experimental protocols, roles of people in investigations and processing and publication of data gathered in investigations. Use of OBI will allow comparison of experimental data from the wide array of scientific disciplines represented by domain experts in the OBI consortium. OBI follows the principles laid out by the OBO foundry, and integrates tightly with other foundry candidate ontologies, such as GO (</a:t>
+            </a:r>
+            <a:r>
+              <a:rPr lang="en-GB" sz="4600" i="1" dirty="0" err="1" smtClean="0">
+                <a:latin typeface="Calibri" pitchFamily="-65" charset="0"/>
+              </a:rPr>
               <a:t>www.geneontology.org</a:t>
             </a:r>
             <a:r>
-              <a:rPr lang="en-US" sz="5000" i="1" dirty="0" smtClean="0"/>
+              <a:rPr lang="en-US" sz="4600" i="1" dirty="0" smtClean="0">
+                <a:latin typeface="Calibri" pitchFamily="-65" charset="0"/>
+              </a:rPr>
               <a:t>) and </a:t>
             </a:r>
             <a:r>
-              <a:rPr lang="en-US" sz="5000" i="1" dirty="0" err="1" smtClean="0"/>
+              <a:rPr lang="en-US" sz="4600" i="1" dirty="0" err="1" smtClean="0">
+                <a:latin typeface="Calibri" pitchFamily="-65" charset="0"/>
+              </a:rPr>
               <a:t>ChEBI</a:t>
             </a:r>
             <a:r>
-              <a:rPr lang="en-US" sz="5000" i="1" dirty="0"/>
-              <a:t> </a:t>
-            </a:r>
-            <a:r>
-              <a:rPr lang="en-US" sz="5000" i="1" dirty="0" smtClean="0"/>
-              <a:t>(</a:t>
-            </a:r>
-            <a:r>
-              <a:rPr lang="en-GB" sz="5000" i="1" dirty="0" smtClean="0"/>
-              <a:t>www.ebi.ac.uk/chebi/</a:t>
-            </a:r>
-            <a:r>
-              <a:rPr lang="en-US" sz="5000" i="1" dirty="0" smtClean="0"/>
-              <a:t>) whose terms are used to describe biological reality. The use of OBI by the scientific community to represent or annotate their investigations within electronic data resources will alleviate the need for lower accuracy text mining and enable semantic web searches and third-party understanding of information related to life-science and clinical investigations.</a:t>
-            </a:r>
-            <a:endParaRPr lang="en-US" sz="5000" dirty="0"/>
+              <a:rPr lang="en-US" sz="4600" i="1" dirty="0" smtClean="0">
+                <a:latin typeface="Calibri" pitchFamily="-65" charset="0"/>
+              </a:rPr>
+              <a:t> (</a:t>
+            </a:r>
+            <a:r>
+              <a:rPr lang="en-GB" sz="4600" i="1" dirty="0" err="1" smtClean="0">
+                <a:latin typeface="Calibri" pitchFamily="-65" charset="0"/>
+              </a:rPr>
+              <a:t>www.ebi.ac.uk/chebi</a:t>
+            </a:r>
+            <a:r>
+              <a:rPr lang="en-GB" sz="4600" i="1" dirty="0" smtClean="0">
+                <a:latin typeface="Calibri" pitchFamily="-65" charset="0"/>
+              </a:rPr>
+              <a:t>/</a:t>
+            </a:r>
+            <a:r>
+              <a:rPr lang="en-US" sz="4600" i="1" dirty="0" smtClean="0">
+                <a:latin typeface="Calibri" pitchFamily="-65" charset="0"/>
+              </a:rPr>
+              <a:t>) whose terms are used to describe biological reality. The use of OBI by the scientific community to represent or annotate their investigations within electronic data resources will facilitate interdisciplinary data synthesis, enable access to their data on the semantic web and improve third-party understanding of information related to life-science and clinical investigations.</a:t>
+            </a:r>
+            <a:endParaRPr lang="en-US" sz="4600" dirty="0">
+              <a:latin typeface="Calibri" pitchFamily="-65" charset="0"/>
+            </a:endParaRPr>
           </a:p>
         </p:txBody>
       </p:sp>
@@ -4391,9 +4414,9 @@
         <p:grpSpPr>
           <a:xfrm>
             <a:off x="731520" y="21607975"/>
-            <a:ext cx="31455360" cy="18231729"/>
+            <a:ext cx="31455360" cy="18583266"/>
             <a:chOff x="152400" y="4800600"/>
-            <a:chExt cx="6553200" cy="4114800"/>
+            <a:chExt cx="6553200" cy="4194140"/>
           </a:xfrm>
         </p:grpSpPr>
         <p:sp>
@@ -4479,8 +4502,8 @@
           </p:nvSpPr>
           <p:spPr>
             <a:xfrm>
-              <a:off x="4540250" y="5105400"/>
-              <a:ext cx="2155825" cy="3695456"/>
+              <a:off x="4540250" y="5083175"/>
+              <a:ext cx="2155825" cy="3911565"/>
             </a:xfrm>
             <a:prstGeom prst="rect">
               <a:avLst/>
@@ -4493,71 +4516,110 @@
             </a:bodyPr>
             <a:lstStyle/>
             <a:p>
+              <a:pPr>
+                <a:lnSpc>
+                  <a:spcPts val="5500"/>
+                </a:lnSpc>
+              </a:pPr>
               <a:r>
-                <a:rPr lang="en-US" sz="4600" b="1" dirty="0" smtClean="0"/>
+                <a:rPr lang="en-US" sz="4800" b="1" dirty="0" smtClean="0">
+                  <a:latin typeface="Calibri" pitchFamily="-65" charset="0"/>
+                </a:rPr>
                 <a:t>Measuring the glucose concentration in blood. </a:t>
               </a:r>
               <a:r>
-                <a:rPr lang="en-US" sz="4600" dirty="0" smtClean="0"/>
+                <a:rPr lang="en-US" sz="4800" dirty="0" smtClean="0">
+                  <a:latin typeface="Calibri" pitchFamily="-65" charset="0"/>
+                </a:rPr>
                 <a:t>The large</a:t>
               </a:r>
               <a:r>
-                <a:rPr lang="en-US" sz="4600" b="1" dirty="0" smtClean="0"/>
+                <a:rPr lang="en-US" sz="4800" b="1" dirty="0" smtClean="0">
+                  <a:latin typeface="Calibri" pitchFamily="-65" charset="0"/>
+                </a:rPr>
                 <a:t> </a:t>
               </a:r>
               <a:r>
-                <a:rPr lang="en-US" sz="4600" dirty="0" smtClean="0"/>
+                <a:rPr lang="en-US" sz="4800" dirty="0" smtClean="0">
+                  <a:latin typeface="Calibri" pitchFamily="-65" charset="0"/>
+                </a:rPr>
                 <a:t>boxes represent processes and contain their participants. The </a:t>
               </a:r>
               <a:r>
-                <a:rPr lang="en-US" sz="4600" i="1" dirty="0" smtClean="0"/>
+                <a:rPr lang="en-US" sz="4800" i="1" dirty="0" smtClean="0">
+                  <a:latin typeface="Calibri" pitchFamily="-65" charset="0"/>
+                </a:rPr>
                 <a:t>taking sample from organism</a:t>
               </a:r>
               <a:r>
-                <a:rPr lang="en-US" sz="4600" dirty="0" smtClean="0"/>
+                <a:rPr lang="en-US" sz="4800" dirty="0" smtClean="0">
+                  <a:latin typeface="Calibri" pitchFamily="-65" charset="0"/>
+                </a:rPr>
                 <a:t> process takes place first. In this process, a syringe is used as a device to draw blood from the mouse which bears the specimen role. At the end of this process, a tube contains the blood specimen. In a second step, that blood will be used as the </a:t>
               </a:r>
               <a:r>
-                <a:rPr lang="en-US" sz="4600" dirty="0" err="1" smtClean="0"/>
+                <a:rPr lang="en-US" sz="4800" dirty="0" err="1" smtClean="0">
+                  <a:latin typeface="Calibri" pitchFamily="-65" charset="0"/>
+                </a:rPr>
                 <a:t>evaluant</a:t>
               </a:r>
               <a:r>
-                <a:rPr lang="en-US" sz="4600" dirty="0" smtClean="0"/>
+                <a:rPr lang="en-US" sz="4800" dirty="0" smtClean="0">
+                  <a:latin typeface="Calibri" pitchFamily="-65" charset="0"/>
+                </a:rPr>
                 <a:t> in an </a:t>
               </a:r>
               <a:r>
-                <a:rPr lang="en-US" sz="4600" dirty="0" err="1" smtClean="0"/>
+                <a:rPr lang="en-US" sz="4800" dirty="0" err="1" smtClean="0">
+                  <a:latin typeface="Calibri" pitchFamily="-65" charset="0"/>
+                </a:rPr>
                 <a:t>analyte</a:t>
               </a:r>
               <a:r>
-                <a:rPr lang="en-US" sz="4600" dirty="0" smtClean="0"/>
+                <a:rPr lang="en-US" sz="4800" dirty="0" smtClean="0">
+                  <a:latin typeface="Calibri" pitchFamily="-65" charset="0"/>
+                </a:rPr>
                 <a:t> assay in which the concentration of glucose in the blood is measured. A </a:t>
               </a:r>
               <a:r>
-                <a:rPr lang="en-US" sz="4600" dirty="0" err="1" smtClean="0"/>
+                <a:rPr lang="en-US" sz="4800" dirty="0" err="1" smtClean="0">
+                  <a:latin typeface="Calibri" pitchFamily="-65" charset="0"/>
+                </a:rPr>
                 <a:t>glucometer</a:t>
               </a:r>
               <a:r>
-                <a:rPr lang="en-US" sz="4600" dirty="0" smtClean="0"/>
+                <a:rPr lang="en-US" sz="4800" dirty="0" smtClean="0">
+                  <a:latin typeface="Calibri" pitchFamily="-65" charset="0"/>
+                </a:rPr>
                 <a:t> device is used to make this measurement. The </a:t>
               </a:r>
               <a:r>
-                <a:rPr lang="en-US" sz="4600" dirty="0" err="1" smtClean="0"/>
+                <a:rPr lang="en-US" sz="4800" dirty="0" err="1" smtClean="0">
+                  <a:latin typeface="Calibri" pitchFamily="-65" charset="0"/>
+                </a:rPr>
                 <a:t>analyte</a:t>
               </a:r>
               <a:r>
-                <a:rPr lang="en-US" sz="4600" dirty="0" smtClean="0"/>
+                <a:rPr lang="en-US" sz="4800" dirty="0" smtClean="0">
+                  <a:latin typeface="Calibri" pitchFamily="-65" charset="0"/>
+                </a:rPr>
                 <a:t> role inheres in the glucose molecules scattered throughout the blood specimen. The objective of this planned process is to analyze the </a:t>
               </a:r>
               <a:r>
-                <a:rPr lang="en-US" sz="4600" dirty="0" err="1" smtClean="0"/>
+                <a:rPr lang="en-US" sz="4800" dirty="0" err="1" smtClean="0">
+                  <a:latin typeface="Calibri" pitchFamily="-65" charset="0"/>
+                </a:rPr>
                 <a:t>analyte</a:t>
               </a:r>
               <a:r>
-                <a:rPr lang="en-US" sz="4600" dirty="0" smtClean="0"/>
-                <a:t> (glucose) concentration. This modeling of a specific use case is used as the basis for generation of pattern templates allowing us to automate following additions of similar processes</a:t>
+                <a:rPr lang="en-US" sz="4800" dirty="0" smtClean="0">
+                  <a:latin typeface="Calibri" pitchFamily="-65" charset="0"/>
+                </a:rPr>
+                <a:t> (glucose) concentration. This model of a specific use case is being used as the basis for generation of templates allowing us to automate subsequent additions of similar processes</a:t>
               </a:r>
-              <a:endParaRPr lang="en-US" sz="4600" dirty="0"/>
+              <a:endParaRPr lang="en-US" sz="4800" dirty="0">
+                <a:latin typeface="Calibri" pitchFamily="-65" charset="0"/>
+              </a:endParaRPr>
             </a:p>
           </p:txBody>
         </p:sp>
@@ -4660,11 +4722,7 @@
             </a:r>
             <a:r>
               <a:rPr lang="en-US" sz="4400" dirty="0" smtClean="0"/>
-              <a:t>are initiated by an agent in order to achieve a specific objective. </a:t>
-            </a:r>
-            <a:r>
-              <a:rPr lang="en-US" sz="4400" dirty="0" smtClean="0"/>
-              <a:t>This includes all research activities, such as an </a:t>
+              <a:t>are initiated by an agent in order to achieve a specific objective. This includes all research activities, such as an </a:t>
             </a:r>
             <a:r>
               <a:rPr lang="en-US" sz="4400" i="1" dirty="0" smtClean="0"/>
@@ -4680,11 +4738,7 @@
             </a:r>
             <a:r>
               <a:rPr lang="en-US" sz="4400" dirty="0" smtClean="0"/>
-              <a:t>.</a:t>
-            </a:r>
-            <a:r>
-              <a:rPr lang="en-US" sz="4400" dirty="0" smtClean="0"/>
-              <a:t> </a:t>
+              <a:t>. </a:t>
             </a:r>
           </a:p>
           <a:p>

</xml_diff>